<commit_message>
[GUI] Bild fuer PPP hinzugefuegt
</commit_message>
<xml_diff>
--- a/Vorpraesi_HS-AMR.pptx
+++ b/Vorpraesi_HS-AMR.pptx
@@ -8,18 +8,19 @@
     <p:sldMasterId id="2147483684" r:id="rId4"/>
   </p:sldMasterIdLst>
   <p:notesMasterIdLst>
-    <p:notesMasterId r:id="rId11"/>
+    <p:notesMasterId r:id="rId12"/>
   </p:notesMasterIdLst>
   <p:handoutMasterIdLst>
-    <p:handoutMasterId r:id="rId12"/>
+    <p:handoutMasterId r:id="rId13"/>
   </p:handoutMasterIdLst>
   <p:sldIdLst>
     <p:sldId id="256" r:id="rId5"/>
     <p:sldId id="257" r:id="rId6"/>
     <p:sldId id="261" r:id="rId7"/>
     <p:sldId id="260" r:id="rId8"/>
-    <p:sldId id="258" r:id="rId9"/>
-    <p:sldId id="259" r:id="rId10"/>
+    <p:sldId id="262" r:id="rId9"/>
+    <p:sldId id="258" r:id="rId10"/>
+    <p:sldId id="259" r:id="rId11"/>
   </p:sldIdLst>
   <p:sldSz cx="12192000" cy="6858000"/>
   <p:notesSz cx="7559675" cy="10691813"/>
@@ -118,6 +119,11 @@
       </a:defRPr>
     </a:lvl9pPr>
   </p:defaultTextStyle>
+  <p:extLst>
+    <p:ext uri="{EFAFB233-063F-42B5-8137-9DF3F51BA10A}">
+      <p15:sldGuideLst xmlns:p15="http://schemas.microsoft.com/office/powerpoint/2012/main"/>
+    </p:ext>
+  </p:extLst>
 </p:presentation>
 </file>
 
@@ -1068,7 +1074,7 @@
           <a:p>
             <a:pPr lvl="0"/>
             <a:fld id="{B2FB0E44-42CB-4E2C-A4A6-50A99B8FDC96}" type="slidenum">
-              <a:t>5</a:t>
+              <a:t>6</a:t>
             </a:fld>
             <a:endParaRPr lang="en-US"/>
           </a:p>
@@ -1179,7 +1185,7 @@
           <a:p>
             <a:pPr lvl="0"/>
             <a:fld id="{E6E51FBF-92B1-4B43-993A-1092077131BC}" type="slidenum">
-              <a:t>6</a:t>
+              <a:t>7</a:t>
             </a:fld>
             <a:endParaRPr lang="en-US"/>
           </a:p>
@@ -14971,6 +14977,143 @@
 
 <file path=ppt/slides/slide5.xml><?xml version="1.0" encoding="utf-8"?>
 <p:sld xmlns:a="http://schemas.openxmlformats.org/drawingml/2006/main" xmlns:r="http://schemas.openxmlformats.org/officeDocument/2006/relationships" xmlns:p="http://schemas.openxmlformats.org/presentationml/2006/main">
+  <p:cSld>
+    <p:bg>
+      <p:bgPr>
+        <a:solidFill>
+          <a:schemeClr val="bg1"/>
+        </a:solidFill>
+        <a:effectLst/>
+      </p:bgPr>
+    </p:bg>
+    <p:spTree>
+      <p:nvGrpSpPr>
+        <p:cNvPr id="1" name=""/>
+        <p:cNvGrpSpPr/>
+        <p:nvPr/>
+      </p:nvGrpSpPr>
+      <p:grpSpPr>
+        <a:xfrm>
+          <a:off x="0" y="0"/>
+          <a:ext cx="0" cy="0"/>
+          <a:chOff x="0" y="0"/>
+          <a:chExt cx="0" cy="0"/>
+        </a:xfrm>
+      </p:grpSpPr>
+      <p:sp>
+        <p:nvSpPr>
+          <p:cNvPr id="2" name="Titel 1">
+            <a:extLst>
+              <a:ext uri="{FF2B5EF4-FFF2-40B4-BE49-F238E27FC236}">
+                <a16:creationId xmlns:a16="http://schemas.microsoft.com/office/drawing/2014/main" id="{688DF85D-3F0D-48E6-9EA1-A84BFA0C4E5A}"/>
+              </a:ext>
+            </a:extLst>
+          </p:cNvPr>
+          <p:cNvSpPr>
+            <a:spLocks noGrp="1"/>
+          </p:cNvSpPr>
+          <p:nvPr>
+            <p:ph type="title"/>
+          </p:nvPr>
+        </p:nvSpPr>
+        <p:spPr>
+          <a:xfrm>
+            <a:off x="838200" y="365125"/>
+            <a:ext cx="10515600" cy="1325563"/>
+          </a:xfrm>
+        </p:spPr>
+        <p:txBody>
+          <a:bodyPr>
+            <a:normAutofit/>
+          </a:bodyPr>
+          <a:lstStyle/>
+          <a:p>
+            <a:r>
+              <a:rPr lang="de-DE" sz="4400" b="1">
+                <a:highlight>
+                  <a:scrgbClr r="0" g="0" b="0">
+                    <a:alpha val="0"/>
+                  </a:scrgbClr>
+                </a:highlight>
+                <a:latin typeface="Open Sans" pitchFamily="34"/>
+              </a:rPr>
+              <a:t>5 Bericht </a:t>
+            </a:r>
+            <a:r>
+              <a:rPr lang="de-DE" sz="4400" b="1" err="1">
+                <a:highlight>
+                  <a:scrgbClr r="0" g="0" b="0">
+                    <a:alpha val="0"/>
+                  </a:scrgbClr>
+                </a:highlight>
+                <a:latin typeface="Open Sans" pitchFamily="34"/>
+              </a:rPr>
+              <a:t>Guidance</a:t>
+            </a:r>
+            <a:br>
+              <a:rPr lang="de-DE" sz="4400" b="1">
+                <a:highlight>
+                  <a:scrgbClr r="0" g="0" b="0">
+                    <a:alpha val="0"/>
+                  </a:scrgbClr>
+                </a:highlight>
+                <a:latin typeface="Open Sans" pitchFamily="34"/>
+              </a:rPr>
+            </a:br>
+            <a:endParaRPr lang="de-DE" sz="4400"/>
+          </a:p>
+        </p:txBody>
+      </p:sp>
+      <p:pic>
+        <p:nvPicPr>
+          <p:cNvPr id="5" name="Inhaltsplatzhalter 4" descr="Ein Bild, das Text, Karte enthält.&#10;&#10;Automatisch generierte Beschreibung">
+            <a:extLst>
+              <a:ext uri="{FF2B5EF4-FFF2-40B4-BE49-F238E27FC236}">
+                <a16:creationId xmlns:a16="http://schemas.microsoft.com/office/drawing/2014/main" id="{3EC1CC74-634C-4474-AA28-6402A23C45F1}"/>
+              </a:ext>
+            </a:extLst>
+          </p:cNvPr>
+          <p:cNvPicPr>
+            <a:picLocks noChangeAspect="1"/>
+          </p:cNvPicPr>
+          <p:nvPr/>
+        </p:nvPicPr>
+        <p:blipFill rotWithShape="1">
+          <a:blip r:embed="rId2">
+            <a:extLst>
+              <a:ext uri="{28A0092B-C50C-407E-A947-70E740481C1C}">
+                <a14:useLocalDpi xmlns:a14="http://schemas.microsoft.com/office/drawing/2010/main" val="0"/>
+              </a:ext>
+            </a:extLst>
+          </a:blip>
+          <a:srcRect t="430" r="1" b="2683"/>
+          <a:stretch/>
+        </p:blipFill>
+        <p:spPr>
+          <a:xfrm>
+            <a:off x="838200" y="1210945"/>
+            <a:ext cx="7893818" cy="5411022"/>
+          </a:xfrm>
+          <a:prstGeom prst="rect">
+            <a:avLst/>
+          </a:prstGeom>
+        </p:spPr>
+      </p:pic>
+    </p:spTree>
+    <p:extLst>
+      <p:ext uri="{BB962C8B-B14F-4D97-AF65-F5344CB8AC3E}">
+        <p14:creationId xmlns:p14="http://schemas.microsoft.com/office/powerpoint/2010/main" val="2452959150"/>
+      </p:ext>
+    </p:extLst>
+  </p:cSld>
+  <p:clrMapOvr>
+    <a:masterClrMapping/>
+  </p:clrMapOvr>
+</p:sld>
+</file>
+
+<file path=ppt/slides/slide6.xml><?xml version="1.0" encoding="utf-8"?>
+<p:sld xmlns:a="http://schemas.openxmlformats.org/drawingml/2006/main" xmlns:r="http://schemas.openxmlformats.org/officeDocument/2006/relationships" xmlns:p="http://schemas.openxmlformats.org/presentationml/2006/main">
   <p:cSld name="Barrierefrei &#10;kommunizieren">
     <p:spTree>
       <p:nvGrpSpPr>
@@ -15442,7 +15585,7 @@
 </p:sld>
 </file>
 
-<file path=ppt/slides/slide6.xml><?xml version="1.0" encoding="utf-8"?>
+<file path=ppt/slides/slide7.xml><?xml version="1.0" encoding="utf-8"?>
 <p:sld xmlns:a="http://schemas.openxmlformats.org/drawingml/2006/main" xmlns:r="http://schemas.openxmlformats.org/officeDocument/2006/relationships" xmlns:p="http://schemas.openxmlformats.org/presentationml/2006/main">
   <p:cSld name="Technische Universität &#10;Dresden">
     <p:spTree>

</xml_diff>